<commit_message>
Updated DD releases and resources to V1.1
</commit_message>
<xml_diff>
--- a/resources/2-DD/Interfaces/Interfaces.pptx
+++ b/resources/2-DD/Interfaces/Interfaces.pptx
@@ -3474,6 +3474,8 @@
             <a:solidFill>
               <a:schemeClr val="tx1"/>
             </a:solidFill>
+            <a:headEnd type="arrow"/>
+            <a:tailEnd type="arrow"/>
           </a:ln>
         </p:spPr>
         <p:style>
@@ -3552,7 +3554,7 @@
         </p:nvSpPr>
         <p:spPr>
           <a:xfrm>
-            <a:off x="5112329" y="1096240"/>
+            <a:off x="5112329" y="903142"/>
             <a:ext cx="1482436" cy="408709"/>
           </a:xfrm>
           <a:prstGeom prst="roundRect">
@@ -3605,7 +3607,7 @@
         </p:nvSpPr>
         <p:spPr>
           <a:xfrm>
-            <a:off x="5112329" y="1780307"/>
+            <a:off x="5112329" y="1397440"/>
             <a:ext cx="1482436" cy="408709"/>
           </a:xfrm>
           <a:prstGeom prst="roundRect">
@@ -3693,7 +3695,7 @@
         </p:nvCxnSpPr>
         <p:spPr>
           <a:xfrm>
-            <a:off x="4710545" y="1300593"/>
+            <a:off x="4710545" y="1107495"/>
             <a:ext cx="401783" cy="1"/>
           </a:xfrm>
           <a:prstGeom prst="line">
@@ -3728,7 +3730,7 @@
         </p:nvCxnSpPr>
         <p:spPr>
           <a:xfrm>
-            <a:off x="4710545" y="1984659"/>
+            <a:off x="4710545" y="1601792"/>
             <a:ext cx="401783" cy="1"/>
           </a:xfrm>
           <a:prstGeom prst="line">
@@ -3763,7 +3765,7 @@
         </p:nvSpPr>
         <p:spPr>
           <a:xfrm>
-            <a:off x="5112329" y="2452254"/>
+            <a:off x="5112329" y="1891037"/>
             <a:ext cx="1482436" cy="408709"/>
           </a:xfrm>
           <a:prstGeom prst="roundRect">
@@ -3816,7 +3818,7 @@
         </p:nvCxnSpPr>
         <p:spPr>
           <a:xfrm>
-            <a:off x="4710545" y="2656608"/>
+            <a:off x="4710545" y="2095391"/>
             <a:ext cx="401783" cy="1"/>
           </a:xfrm>
           <a:prstGeom prst="line">
@@ -5084,9 +5086,9 @@
         <p:grpSpPr>
           <a:xfrm>
             <a:off x="1660121" y="8078919"/>
-            <a:ext cx="3050424" cy="1650413"/>
+            <a:ext cx="3050424" cy="1838317"/>
             <a:chOff x="0" y="0"/>
-            <a:chExt cx="1872000" cy="1650413"/>
+            <a:chExt cx="1872000" cy="1838317"/>
           </a:xfrm>
         </p:grpSpPr>
         <p:sp>
@@ -5181,7 +5183,7 @@
           <p:spPr>
             <a:xfrm>
               <a:off x="0" y="342900"/>
-              <a:ext cx="1872000" cy="1307513"/>
+              <a:ext cx="1872000" cy="1495417"/>
             </a:xfrm>
             <a:prstGeom prst="round2SameRect">
               <a:avLst>
@@ -5383,6 +5385,41 @@
                 </a:rPr>
                 <a:t>reportParked (ParkingArea where)</a:t>
               </a:r>
+            </a:p>
+            <a:p>
+              <a:pPr marL="171450" lvl="0" indent="-171450">
+                <a:buFont typeface="Wingdings" panose="05000000000000000000" pitchFamily="2" charset="2"/>
+                <a:buChar char="§"/>
+              </a:pPr>
+              <a:r>
+                <a:rPr lang="it-IT" sz="1000">
+                  <a:solidFill>
+                    <a:srgbClr val="000000"/>
+                  </a:solidFill>
+                  <a:latin typeface="Univers 47 CondensedLight" panose="020B0506000000000000" pitchFamily="34" charset="0"/>
+                  <a:ea typeface="Calibri" panose="020F0502020204030204" pitchFamily="34" charset="0"/>
+                  <a:cs typeface="Times New Roman" panose="02020603050405020304" pitchFamily="18" charset="0"/>
+                </a:rPr>
+                <a:t>getIgnitionStatus()</a:t>
+              </a:r>
+            </a:p>
+            <a:p>
+              <a:pPr marL="171450" lvl="0" indent="-171450">
+                <a:buFont typeface="Wingdings" panose="05000000000000000000" pitchFamily="2" charset="2"/>
+                <a:buChar char="§"/>
+              </a:pPr>
+              <a:r>
+                <a:rPr lang="it-IT" sz="1000">
+                  <a:solidFill>
+                    <a:srgbClr val="000000"/>
+                  </a:solidFill>
+                  <a:effectLst/>
+                  <a:latin typeface="Univers 47 CondensedLight" panose="020B0506000000000000" pitchFamily="34" charset="0"/>
+                  <a:ea typeface="Calibri" panose="020F0502020204030204" pitchFamily="34" charset="0"/>
+                  <a:cs typeface="Times New Roman" panose="02020603050405020304" pitchFamily="18" charset="0"/>
+                </a:rPr>
+                <a:t>getPosition()</a:t>
+              </a:r>
               <a:endParaRPr lang="it-IT" sz="1000">
                 <a:effectLst/>
                 <a:latin typeface="Univers 47 CondensedLight" panose="020B0506000000000000" pitchFamily="34" charset="0"/>
@@ -5451,7 +5488,6 @@
           <p:cNvPr id="55" name="Connettore diritto 54"/>
           <p:cNvCxnSpPr>
             <a:stCxn id="54" idx="3"/>
-            <a:endCxn id="53" idx="2"/>
           </p:cNvCxnSpPr>
           <p:nvPr/>
         </p:nvCxnSpPr>
@@ -5494,7 +5530,7 @@
         </p:nvSpPr>
         <p:spPr>
           <a:xfrm>
-            <a:off x="5112329" y="8163771"/>
+            <a:off x="5112329" y="8331350"/>
             <a:ext cx="1482436" cy="408709"/>
           </a:xfrm>
           <a:prstGeom prst="roundRect">
@@ -5547,7 +5583,7 @@
         </p:nvCxnSpPr>
         <p:spPr>
           <a:xfrm>
-            <a:off x="4710545" y="8368124"/>
+            <a:off x="4710545" y="8535703"/>
             <a:ext cx="401783" cy="1"/>
           </a:xfrm>
           <a:prstGeom prst="line">
@@ -5582,7 +5618,7 @@
         </p:nvSpPr>
         <p:spPr>
           <a:xfrm>
-            <a:off x="5112329" y="8697175"/>
+            <a:off x="5112329" y="8864754"/>
             <a:ext cx="1482436" cy="408709"/>
           </a:xfrm>
           <a:prstGeom prst="roundRect">
@@ -5635,7 +5671,7 @@
         </p:nvCxnSpPr>
         <p:spPr>
           <a:xfrm>
-            <a:off x="4710545" y="8901529"/>
+            <a:off x="4710545" y="9069108"/>
             <a:ext cx="401783" cy="1"/>
           </a:xfrm>
           <a:prstGeom prst="line">
@@ -5672,7 +5708,7 @@
         </p:nvSpPr>
         <p:spPr>
           <a:xfrm>
-            <a:off x="5112329" y="9235760"/>
+            <a:off x="5112329" y="9403339"/>
             <a:ext cx="1482436" cy="408709"/>
           </a:xfrm>
           <a:prstGeom prst="roundRect">
@@ -5725,7 +5761,95 @@
         </p:nvCxnSpPr>
         <p:spPr>
           <a:xfrm>
-            <a:off x="4710545" y="9443597"/>
+            <a:off x="4710545" y="9611176"/>
+            <a:ext cx="401783" cy="1"/>
+          </a:xfrm>
+          <a:prstGeom prst="line">
+            <a:avLst/>
+          </a:prstGeom>
+          <a:ln w="12700">
+            <a:solidFill>
+              <a:schemeClr val="tx1"/>
+            </a:solidFill>
+          </a:ln>
+        </p:spPr>
+        <p:style>
+          <a:lnRef idx="1">
+            <a:schemeClr val="accent1"/>
+          </a:lnRef>
+          <a:fillRef idx="0">
+            <a:schemeClr val="accent1"/>
+          </a:fillRef>
+          <a:effectRef idx="0">
+            <a:schemeClr val="accent1"/>
+          </a:effectRef>
+          <a:fontRef idx="minor">
+            <a:schemeClr val="tx1"/>
+          </a:fontRef>
+        </p:style>
+      </p:cxnSp>
+      <p:sp>
+        <p:nvSpPr>
+          <p:cNvPr id="49" name="Rettangolo arrotondato 48"/>
+          <p:cNvSpPr/>
+          <p:nvPr/>
+        </p:nvSpPr>
+        <p:spPr>
+          <a:xfrm>
+            <a:off x="5112329" y="2383785"/>
+            <a:ext cx="1482436" cy="408709"/>
+          </a:xfrm>
+          <a:prstGeom prst="roundRect">
+            <a:avLst/>
+          </a:prstGeom>
+          <a:solidFill>
+            <a:schemeClr val="accent2"/>
+          </a:solidFill>
+          <a:ln>
+            <a:solidFill>
+              <a:schemeClr val="tx1"/>
+            </a:solidFill>
+          </a:ln>
+        </p:spPr>
+        <p:style>
+          <a:lnRef idx="2">
+            <a:schemeClr val="accent1">
+              <a:shade val="50000"/>
+            </a:schemeClr>
+          </a:lnRef>
+          <a:fillRef idx="1">
+            <a:schemeClr val="accent1"/>
+          </a:fillRef>
+          <a:effectRef idx="0">
+            <a:schemeClr val="accent1"/>
+          </a:effectRef>
+          <a:fontRef idx="minor">
+            <a:schemeClr val="lt1"/>
+          </a:fontRef>
+        </p:style>
+        <p:txBody>
+          <a:bodyPr rtlCol="0" anchor="ctr"/>
+          <a:lstStyle/>
+          <a:p>
+            <a:pPr algn="ctr"/>
+            <a:r>
+              <a:rPr lang="it-IT" sz="1400" b="1">
+                <a:latin typeface="Univers 47 CondensedLight" panose="020B0506000000000000" pitchFamily="34" charset="0"/>
+              </a:rPr>
+              <a:t>CarDataService</a:t>
+            </a:r>
+          </a:p>
+        </p:txBody>
+      </p:sp>
+      <p:cxnSp>
+        <p:nvCxnSpPr>
+          <p:cNvPr id="50" name="Connettore diritto 49"/>
+          <p:cNvCxnSpPr/>
+          <p:nvPr/>
+        </p:nvCxnSpPr>
+        <p:spPr>
+          <a:xfrm>
+            <a:off x="4710545" y="2588139"/>
             <a:ext cx="401783" cy="1"/>
           </a:xfrm>
           <a:prstGeom prst="line">

</xml_diff>

<commit_message>
PP V1.0 release and DD updated to V1.3
</commit_message>
<xml_diff>
--- a/resources/2-DD/Interfaces/Interfaces.pptx
+++ b/resources/2-DD/Interfaces/Interfaces.pptx
@@ -245,7 +245,7 @@
           <a:p>
             <a:fld id="{388EA69E-C7C0-4BED-A8FB-4761B582D87C}" type="datetimeFigureOut">
               <a:rPr lang="it-IT" smtClean="0"/>
-              <a:t>11/12/2016</a:t>
+              <a:t>14/01/2017</a:t>
             </a:fld>
             <a:endParaRPr lang="it-IT"/>
           </a:p>
@@ -415,7 +415,7 @@
           <a:p>
             <a:fld id="{388EA69E-C7C0-4BED-A8FB-4761B582D87C}" type="datetimeFigureOut">
               <a:rPr lang="it-IT" smtClean="0"/>
-              <a:t>11/12/2016</a:t>
+              <a:t>14/01/2017</a:t>
             </a:fld>
             <a:endParaRPr lang="it-IT"/>
           </a:p>
@@ -595,7 +595,7 @@
           <a:p>
             <a:fld id="{388EA69E-C7C0-4BED-A8FB-4761B582D87C}" type="datetimeFigureOut">
               <a:rPr lang="it-IT" smtClean="0"/>
-              <a:t>11/12/2016</a:t>
+              <a:t>14/01/2017</a:t>
             </a:fld>
             <a:endParaRPr lang="it-IT"/>
           </a:p>
@@ -765,7 +765,7 @@
           <a:p>
             <a:fld id="{388EA69E-C7C0-4BED-A8FB-4761B582D87C}" type="datetimeFigureOut">
               <a:rPr lang="it-IT" smtClean="0"/>
-              <a:t>11/12/2016</a:t>
+              <a:t>14/01/2017</a:t>
             </a:fld>
             <a:endParaRPr lang="it-IT"/>
           </a:p>
@@ -1009,7 +1009,7 @@
           <a:p>
             <a:fld id="{388EA69E-C7C0-4BED-A8FB-4761B582D87C}" type="datetimeFigureOut">
               <a:rPr lang="it-IT" smtClean="0"/>
-              <a:t>11/12/2016</a:t>
+              <a:t>14/01/2017</a:t>
             </a:fld>
             <a:endParaRPr lang="it-IT"/>
           </a:p>
@@ -1241,7 +1241,7 @@
           <a:p>
             <a:fld id="{388EA69E-C7C0-4BED-A8FB-4761B582D87C}" type="datetimeFigureOut">
               <a:rPr lang="it-IT" smtClean="0"/>
-              <a:t>11/12/2016</a:t>
+              <a:t>14/01/2017</a:t>
             </a:fld>
             <a:endParaRPr lang="it-IT"/>
           </a:p>
@@ -1608,7 +1608,7 @@
           <a:p>
             <a:fld id="{388EA69E-C7C0-4BED-A8FB-4761B582D87C}" type="datetimeFigureOut">
               <a:rPr lang="it-IT" smtClean="0"/>
-              <a:t>11/12/2016</a:t>
+              <a:t>14/01/2017</a:t>
             </a:fld>
             <a:endParaRPr lang="it-IT"/>
           </a:p>
@@ -1726,7 +1726,7 @@
           <a:p>
             <a:fld id="{388EA69E-C7C0-4BED-A8FB-4761B582D87C}" type="datetimeFigureOut">
               <a:rPr lang="it-IT" smtClean="0"/>
-              <a:t>11/12/2016</a:t>
+              <a:t>14/01/2017</a:t>
             </a:fld>
             <a:endParaRPr lang="it-IT"/>
           </a:p>
@@ -1821,7 +1821,7 @@
           <a:p>
             <a:fld id="{388EA69E-C7C0-4BED-A8FB-4761B582D87C}" type="datetimeFigureOut">
               <a:rPr lang="it-IT" smtClean="0"/>
-              <a:t>11/12/2016</a:t>
+              <a:t>14/01/2017</a:t>
             </a:fld>
             <a:endParaRPr lang="it-IT"/>
           </a:p>
@@ -2098,7 +2098,7 @@
           <a:p>
             <a:fld id="{388EA69E-C7C0-4BED-A8FB-4761B582D87C}" type="datetimeFigureOut">
               <a:rPr lang="it-IT" smtClean="0"/>
-              <a:t>11/12/2016</a:t>
+              <a:t>14/01/2017</a:t>
             </a:fld>
             <a:endParaRPr lang="it-IT"/>
           </a:p>
@@ -2355,7 +2355,7 @@
           <a:p>
             <a:fld id="{388EA69E-C7C0-4BED-A8FB-4761B582D87C}" type="datetimeFigureOut">
               <a:rPr lang="it-IT" smtClean="0"/>
-              <a:t>11/12/2016</a:t>
+              <a:t>14/01/2017</a:t>
             </a:fld>
             <a:endParaRPr lang="it-IT"/>
           </a:p>
@@ -2568,7 +2568,7 @@
           <a:p>
             <a:fld id="{388EA69E-C7C0-4BED-A8FB-4761B582D87C}" type="datetimeFigureOut">
               <a:rPr lang="it-IT" smtClean="0"/>
-              <a:t>11/12/2016</a:t>
+              <a:t>14/01/2017</a:t>
             </a:fld>
             <a:endParaRPr lang="it-IT"/>
           </a:p>
@@ -3367,7 +3367,7 @@
                   <a:ea typeface="Calibri" panose="020F0502020204030204" pitchFamily="34" charset="0"/>
                   <a:cs typeface="Times New Roman" panose="02020603050405020304" pitchFamily="18" charset="0"/>
                 </a:rPr>
-                <a:t>askLock (String user, Location pos)</a:t>
+                <a:t>askLock (String user, Ride context)</a:t>
               </a:r>
             </a:p>
             <a:p>
@@ -3385,7 +3385,7 @@
                   <a:ea typeface="Calibri" panose="020F0502020204030204" pitchFamily="34" charset="0"/>
                   <a:cs typeface="Times New Roman" panose="02020603050405020304" pitchFamily="18" charset="0"/>
                 </a:rPr>
-                <a:t>retrieveRidesList()</a:t>
+                <a:t>retrieveRidesList(String user)</a:t>
               </a:r>
               <a:endParaRPr lang="en-US" sz="1000">
                 <a:solidFill>
@@ -3670,6 +3670,8 @@
             <a:solidFill>
               <a:schemeClr val="tx1"/>
             </a:solidFill>
+            <a:headEnd type="arrow"/>
+            <a:tailEnd type="arrow"/>
           </a:ln>
         </p:spPr>
         <p:style>
@@ -5085,10 +5087,10 @@
         </p:nvGrpSpPr>
         <p:grpSpPr>
           <a:xfrm>
-            <a:off x="1660121" y="8078919"/>
-            <a:ext cx="3050424" cy="1838317"/>
+            <a:off x="1660121" y="7809623"/>
+            <a:ext cx="3050424" cy="1955320"/>
             <a:chOff x="0" y="0"/>
-            <a:chExt cx="1872000" cy="1838317"/>
+            <a:chExt cx="1872000" cy="1955320"/>
           </a:xfrm>
         </p:grpSpPr>
         <p:sp>
@@ -5183,7 +5185,7 @@
           <p:spPr>
             <a:xfrm>
               <a:off x="0" y="342900"/>
-              <a:ext cx="1872000" cy="1495417"/>
+              <a:ext cx="1872000" cy="1612420"/>
             </a:xfrm>
             <a:prstGeom prst="round2SameRect">
               <a:avLst>
@@ -5239,7 +5241,7 @@
                   <a:ea typeface="Calibri" panose="020F0502020204030204" pitchFamily="34" charset="0"/>
                   <a:cs typeface="Times New Roman" panose="02020603050405020304" pitchFamily="18" charset="0"/>
                 </a:rPr>
-                <a:t>reportStatus (Status status, CarLeftConditions conditions)</a:t>
+                <a:t>reportStatus (Car carId, Status st, CarLeftConditions cond)</a:t>
               </a:r>
               <a:endParaRPr lang="it-IT" sz="1000">
                 <a:effectLst/>
@@ -5263,7 +5265,7 @@
                   <a:ea typeface="Calibri" panose="020F0502020204030204" pitchFamily="34" charset="0"/>
                   <a:cs typeface="Times New Roman" panose="02020603050405020304" pitchFamily="18" charset="0"/>
                 </a:rPr>
-                <a:t>queryRideStatus ()</a:t>
+                <a:t>queryRideStatus (Car carId)</a:t>
               </a:r>
               <a:endParaRPr lang="it-IT" sz="1000">
                 <a:effectLst/>
@@ -5287,7 +5289,7 @@
                   <a:ea typeface="Calibri" panose="020F0502020204030204" pitchFamily="34" charset="0"/>
                   <a:cs typeface="Times New Roman" panose="02020603050405020304" pitchFamily="18" charset="0"/>
                 </a:rPr>
-                <a:t>reEnableAfterCharge (int newBatteryLevel)</a:t>
+                <a:t>reEnableAfterCharge (Car carId, int newBatteryLevel)</a:t>
               </a:r>
               <a:endParaRPr lang="it-IT" sz="1000">
                 <a:effectLst/>
@@ -5311,7 +5313,7 @@
                   <a:ea typeface="Calibri" panose="020F0502020204030204" pitchFamily="34" charset="0"/>
                   <a:cs typeface="Times New Roman" panose="02020603050405020304" pitchFamily="18" charset="0"/>
                 </a:rPr>
-                <a:t>unlock ()</a:t>
+                <a:t>unlock (Car carId)</a:t>
               </a:r>
               <a:endParaRPr lang="it-IT" sz="1000">
                 <a:effectLst/>
@@ -5335,7 +5337,7 @@
                   <a:ea typeface="Calibri" panose="020F0502020204030204" pitchFamily="34" charset="0"/>
                   <a:cs typeface="Times New Roman" panose="02020603050405020304" pitchFamily="18" charset="0"/>
                 </a:rPr>
-                <a:t>lock ()</a:t>
+                <a:t>lock (Car carId)</a:t>
               </a:r>
               <a:endParaRPr lang="it-IT" sz="1000">
                 <a:effectLst/>
@@ -5359,7 +5361,7 @@
                   <a:ea typeface="Calibri" panose="020F0502020204030204" pitchFamily="34" charset="0"/>
                   <a:cs typeface="Times New Roman" panose="02020603050405020304" pitchFamily="18" charset="0"/>
                 </a:rPr>
-                <a:t>reportIgnited ()</a:t>
+                <a:t>reportIgnited (Car carId)</a:t>
               </a:r>
               <a:endParaRPr lang="it-IT" sz="1000">
                 <a:effectLst/>
@@ -5383,7 +5385,7 @@
                   <a:ea typeface="Calibri" panose="020F0502020204030204" pitchFamily="34" charset="0"/>
                   <a:cs typeface="Times New Roman" panose="02020603050405020304" pitchFamily="18" charset="0"/>
                 </a:rPr>
-                <a:t>reportParked (ParkingArea where)</a:t>
+                <a:t>reportParked (Car carId, ParkingArea where)</a:t>
               </a:r>
             </a:p>
             <a:p>
@@ -5400,8 +5402,17 @@
                   <a:ea typeface="Calibri" panose="020F0502020204030204" pitchFamily="34" charset="0"/>
                   <a:cs typeface="Times New Roman" panose="02020603050405020304" pitchFamily="18" charset="0"/>
                 </a:rPr>
-                <a:t>getIgnitionStatus()</a:t>
-              </a:r>
+                <a:t>updateTime (Car carId, Time time)</a:t>
+              </a:r>
+              <a:endParaRPr lang="it-IT" sz="1000">
+                <a:solidFill>
+                  <a:srgbClr val="000000"/>
+                </a:solidFill>
+                <a:effectLst/>
+                <a:latin typeface="Univers 47 CondensedLight" panose="020B0506000000000000" pitchFamily="34" charset="0"/>
+                <a:ea typeface="Calibri" panose="020F0502020204030204" pitchFamily="34" charset="0"/>
+                <a:cs typeface="Times New Roman" panose="02020603050405020304" pitchFamily="18" charset="0"/>
+              </a:endParaRPr>
             </a:p>
             <a:p>
               <a:pPr marL="171450" lvl="0" indent="-171450">
@@ -5413,12 +5424,29 @@
                   <a:solidFill>
                     <a:srgbClr val="000000"/>
                   </a:solidFill>
-                  <a:effectLst/>
-                  <a:latin typeface="Univers 47 CondensedLight" panose="020B0506000000000000" pitchFamily="34" charset="0"/>
-                  <a:ea typeface="Calibri" panose="020F0502020204030204" pitchFamily="34" charset="0"/>
-                  <a:cs typeface="Times New Roman" panose="02020603050405020304" pitchFamily="18" charset="0"/>
-                </a:rPr>
-                <a:t>getPosition()</a:t>
+                  <a:latin typeface="Univers 47 CondensedLight" panose="020B0506000000000000" pitchFamily="34" charset="0"/>
+                  <a:ea typeface="Calibri" panose="020F0502020204030204" pitchFamily="34" charset="0"/>
+                  <a:cs typeface="Times New Roman" panose="02020603050405020304" pitchFamily="18" charset="0"/>
+                </a:rPr>
+                <a:t>getIgnitionStatus(Car carId)</a:t>
+              </a:r>
+            </a:p>
+            <a:p>
+              <a:pPr marL="171450" lvl="0" indent="-171450">
+                <a:buFont typeface="Wingdings" panose="05000000000000000000" pitchFamily="2" charset="2"/>
+                <a:buChar char="§"/>
+              </a:pPr>
+              <a:r>
+                <a:rPr lang="it-IT" sz="1000">
+                  <a:solidFill>
+                    <a:srgbClr val="000000"/>
+                  </a:solidFill>
+                  <a:effectLst/>
+                  <a:latin typeface="Univers 47 CondensedLight" panose="020B0506000000000000" pitchFamily="34" charset="0"/>
+                  <a:ea typeface="Calibri" panose="020F0502020204030204" pitchFamily="34" charset="0"/>
+                  <a:cs typeface="Times New Roman" panose="02020603050405020304" pitchFamily="18" charset="0"/>
+                </a:rPr>
+                <a:t>getPosition(Car carId)</a:t>
               </a:r>
               <a:endParaRPr lang="it-IT" sz="1000">
                 <a:effectLst/>
@@ -5438,7 +5466,7 @@
         </p:nvSpPr>
         <p:spPr>
           <a:xfrm>
-            <a:off x="170754" y="8871220"/>
+            <a:off x="170754" y="8601924"/>
             <a:ext cx="1136073" cy="408709"/>
           </a:xfrm>
           <a:prstGeom prst="roundRect">
@@ -5493,7 +5521,7 @@
         </p:nvCxnSpPr>
         <p:spPr>
           <a:xfrm>
-            <a:off x="1306827" y="9075575"/>
+            <a:off x="1306827" y="8806279"/>
             <a:ext cx="353294" cy="1"/>
           </a:xfrm>
           <a:prstGeom prst="line">
@@ -5530,7 +5558,7 @@
         </p:nvSpPr>
         <p:spPr>
           <a:xfrm>
-            <a:off x="5112329" y="8331350"/>
+            <a:off x="5112329" y="8062054"/>
             <a:ext cx="1482436" cy="408709"/>
           </a:xfrm>
           <a:prstGeom prst="roundRect">
@@ -5583,7 +5611,7 @@
         </p:nvCxnSpPr>
         <p:spPr>
           <a:xfrm>
-            <a:off x="4710545" y="8535703"/>
+            <a:off x="4710545" y="8266407"/>
             <a:ext cx="401783" cy="1"/>
           </a:xfrm>
           <a:prstGeom prst="line">
@@ -5618,7 +5646,7 @@
         </p:nvSpPr>
         <p:spPr>
           <a:xfrm>
-            <a:off x="5112329" y="8864754"/>
+            <a:off x="5112329" y="8595458"/>
             <a:ext cx="1482436" cy="408709"/>
           </a:xfrm>
           <a:prstGeom prst="roundRect">
@@ -5671,7 +5699,7 @@
         </p:nvCxnSpPr>
         <p:spPr>
           <a:xfrm>
-            <a:off x="4710545" y="9069108"/>
+            <a:off x="4710545" y="8799812"/>
             <a:ext cx="401783" cy="1"/>
           </a:xfrm>
           <a:prstGeom prst="line">
@@ -5708,7 +5736,7 @@
         </p:nvSpPr>
         <p:spPr>
           <a:xfrm>
-            <a:off x="5112329" y="9403339"/>
+            <a:off x="5112329" y="9134043"/>
             <a:ext cx="1482436" cy="408709"/>
           </a:xfrm>
           <a:prstGeom prst="roundRect">
@@ -5761,7 +5789,7 @@
         </p:nvCxnSpPr>
         <p:spPr>
           <a:xfrm>
-            <a:off x="4710545" y="9611176"/>
+            <a:off x="4710545" y="9341880"/>
             <a:ext cx="401783" cy="1"/>
           </a:xfrm>
           <a:prstGeom prst="line">
@@ -6477,6 +6505,8 @@
             <a:solidFill>
               <a:schemeClr val="tx1"/>
             </a:solidFill>
+            <a:headEnd type="arrow"/>
+            <a:tailEnd type="arrow"/>
           </a:ln>
         </p:spPr>
         <p:style>
@@ -6855,7 +6885,7 @@
                   <a:ea typeface="Calibri" panose="020F0502020204030204" pitchFamily="34" charset="0"/>
                   <a:cs typeface="Times New Roman" panose="02020603050405020304" pitchFamily="18" charset="0"/>
                 </a:rPr>
-                <a:t>stopReservationTimer</a:t>
+                <a:t>createReservation</a:t>
               </a:r>
               <a:r>
                 <a:rPr lang="en-US" sz="900" dirty="0">
@@ -6867,7 +6897,7 @@
                   <a:ea typeface="Calibri" panose="020F0502020204030204" pitchFamily="34" charset="0"/>
                   <a:cs typeface="Times New Roman" panose="02020603050405020304" pitchFamily="18" charset="0"/>
                 </a:rPr>
-                <a:t> (Reservation reservation)</a:t>
+                <a:t> (String user, Car car)</a:t>
               </a:r>
               <a:endParaRPr lang="it-IT" sz="900" dirty="0">
                 <a:effectLst/>
@@ -6891,7 +6921,7 @@
                   <a:ea typeface="Calibri" panose="020F0502020204030204" pitchFamily="34" charset="0"/>
                   <a:cs typeface="Times New Roman" panose="02020603050405020304" pitchFamily="18" charset="0"/>
                 </a:rPr>
-                <a:t>createReservation</a:t>
+                <a:t>checkReservationStatus</a:t>
               </a:r>
               <a:r>
                 <a:rPr lang="en-US" sz="900" dirty="0">
@@ -6903,7 +6933,7 @@
                   <a:ea typeface="Calibri" panose="020F0502020204030204" pitchFamily="34" charset="0"/>
                   <a:cs typeface="Times New Roman" panose="02020603050405020304" pitchFamily="18" charset="0"/>
                 </a:rPr>
-                <a:t> (String user, Car car)</a:t>
+                <a:t> (Reservation reservation)</a:t>
               </a:r>
               <a:endParaRPr lang="it-IT" sz="900" dirty="0">
                 <a:effectLst/>
@@ -6927,7 +6957,7 @@
                   <a:ea typeface="Calibri" panose="020F0502020204030204" pitchFamily="34" charset="0"/>
                   <a:cs typeface="Times New Roman" panose="02020603050405020304" pitchFamily="18" charset="0"/>
                 </a:rPr>
-                <a:t>checkReservationStatus</a:t>
+                <a:t>addSharedUser</a:t>
               </a:r>
               <a:r>
                 <a:rPr lang="en-US" sz="900" dirty="0">
@@ -6939,7 +6969,70 @@
                   <a:ea typeface="Calibri" panose="020F0502020204030204" pitchFamily="34" charset="0"/>
                   <a:cs typeface="Times New Roman" panose="02020603050405020304" pitchFamily="18" charset="0"/>
                 </a:rPr>
-                <a:t> (Reservation reservation)</a:t>
+                <a:t> (String user, Reservation </a:t>
+              </a:r>
+              <a:r>
+                <a:rPr lang="en-US" sz="900" dirty="0" err="1">
+                  <a:solidFill>
+                    <a:srgbClr val="000000"/>
+                  </a:solidFill>
+                  <a:effectLst/>
+                  <a:latin typeface="Univers 47 CondensedLight" panose="020B0506000000000000" pitchFamily="34" charset="0"/>
+                  <a:ea typeface="Calibri" panose="020F0502020204030204" pitchFamily="34" charset="0"/>
+                  <a:cs typeface="Times New Roman" panose="02020603050405020304" pitchFamily="18" charset="0"/>
+                </a:rPr>
+                <a:t>reservation</a:t>
+              </a:r>
+              <a:r>
+                <a:rPr lang="en-US" sz="900" dirty="0">
+                  <a:solidFill>
+                    <a:srgbClr val="000000"/>
+                  </a:solidFill>
+                  <a:effectLst/>
+                  <a:latin typeface="Univers 47 CondensedLight" panose="020B0506000000000000" pitchFamily="34" charset="0"/>
+                  <a:ea typeface="Calibri" panose="020F0502020204030204" pitchFamily="34" charset="0"/>
+                  <a:cs typeface="Times New Roman" panose="02020603050405020304" pitchFamily="18" charset="0"/>
+                </a:rPr>
+                <a:t>,</a:t>
+              </a:r>
+            </a:p>
+            <a:p>
+              <a:pPr marL="809625" lvl="0" indent="-809625"/>
+              <a:r>
+                <a:rPr lang="en-US" sz="900" dirty="0">
+                  <a:solidFill>
+                    <a:srgbClr val="000000"/>
+                  </a:solidFill>
+                  <a:effectLst/>
+                  <a:latin typeface="Univers 47 CondensedLight" panose="020B0506000000000000" pitchFamily="34" charset="0"/>
+                  <a:ea typeface="Calibri" panose="020F0502020204030204" pitchFamily="34" charset="0"/>
+                  <a:cs typeface="Times New Roman" panose="02020603050405020304" pitchFamily="18" charset="0"/>
+                </a:rPr>
+                <a:t>	 String </a:t>
+              </a:r>
+              <a:r>
+                <a:rPr lang="en-US" sz="900" dirty="0" err="1">
+                  <a:solidFill>
+                    <a:srgbClr val="000000"/>
+                  </a:solidFill>
+                  <a:effectLst/>
+                  <a:latin typeface="Univers 47 CondensedLight" panose="020B0506000000000000" pitchFamily="34" charset="0"/>
+                  <a:ea typeface="Calibri" panose="020F0502020204030204" pitchFamily="34" charset="0"/>
+                  <a:cs typeface="Times New Roman" panose="02020603050405020304" pitchFamily="18" charset="0"/>
+                </a:rPr>
+                <a:t>userSharing</a:t>
+              </a:r>
+              <a:r>
+                <a:rPr lang="en-US" sz="900" dirty="0">
+                  <a:solidFill>
+                    <a:srgbClr val="000000"/>
+                  </a:solidFill>
+                  <a:effectLst/>
+                  <a:latin typeface="Univers 47 CondensedLight" panose="020B0506000000000000" pitchFamily="34" charset="0"/>
+                  <a:ea typeface="Calibri" panose="020F0502020204030204" pitchFamily="34" charset="0"/>
+                  <a:cs typeface="Times New Roman" panose="02020603050405020304" pitchFamily="18" charset="0"/>
+                </a:rPr>
+                <a:t>)</a:t>
               </a:r>
               <a:endParaRPr lang="it-IT" sz="900" dirty="0">
                 <a:effectLst/>
@@ -6963,7 +7056,7 @@
                   <a:ea typeface="Calibri" panose="020F0502020204030204" pitchFamily="34" charset="0"/>
                   <a:cs typeface="Times New Roman" panose="02020603050405020304" pitchFamily="18" charset="0"/>
                 </a:rPr>
-                <a:t>addSharedUser</a:t>
+                <a:t>markSucceded</a:t>
               </a:r>
               <a:r>
                 <a:rPr lang="en-US" sz="900" dirty="0">
@@ -6975,77 +7068,8 @@
                   <a:ea typeface="Calibri" panose="020F0502020204030204" pitchFamily="34" charset="0"/>
                   <a:cs typeface="Times New Roman" panose="02020603050405020304" pitchFamily="18" charset="0"/>
                 </a:rPr>
-                <a:t> (String user, Reservation </a:t>
-              </a:r>
-              <a:r>
-                <a:rPr lang="en-US" sz="900" dirty="0" err="1">
-                  <a:solidFill>
-                    <a:srgbClr val="000000"/>
-                  </a:solidFill>
-                  <a:effectLst/>
-                  <a:latin typeface="Univers 47 CondensedLight" panose="020B0506000000000000" pitchFamily="34" charset="0"/>
-                  <a:ea typeface="Calibri" panose="020F0502020204030204" pitchFamily="34" charset="0"/>
-                  <a:cs typeface="Times New Roman" panose="02020603050405020304" pitchFamily="18" charset="0"/>
-                </a:rPr>
-                <a:t>reservation</a:t>
-              </a:r>
-              <a:r>
-                <a:rPr lang="en-US" sz="900" dirty="0">
-                  <a:solidFill>
-                    <a:srgbClr val="000000"/>
-                  </a:solidFill>
-                  <a:effectLst/>
-                  <a:latin typeface="Univers 47 CondensedLight" panose="020B0506000000000000" pitchFamily="34" charset="0"/>
-                  <a:ea typeface="Calibri" panose="020F0502020204030204" pitchFamily="34" charset="0"/>
-                  <a:cs typeface="Times New Roman" panose="02020603050405020304" pitchFamily="18" charset="0"/>
-                </a:rPr>
-                <a:t>,</a:t>
-              </a:r>
-            </a:p>
-            <a:p>
-              <a:pPr marL="809625" lvl="0" indent="-809625"/>
-              <a:r>
-                <a:rPr lang="en-US" sz="900" dirty="0">
-                  <a:solidFill>
-                    <a:srgbClr val="000000"/>
-                  </a:solidFill>
-                  <a:effectLst/>
-                  <a:latin typeface="Univers 47 CondensedLight" panose="020B0506000000000000" pitchFamily="34" charset="0"/>
-                  <a:ea typeface="Calibri" panose="020F0502020204030204" pitchFamily="34" charset="0"/>
-                  <a:cs typeface="Times New Roman" panose="02020603050405020304" pitchFamily="18" charset="0"/>
-                </a:rPr>
-                <a:t>	 String </a:t>
-              </a:r>
-              <a:r>
-                <a:rPr lang="en-US" sz="900" dirty="0" err="1">
-                  <a:solidFill>
-                    <a:srgbClr val="000000"/>
-                  </a:solidFill>
-                  <a:effectLst/>
-                  <a:latin typeface="Univers 47 CondensedLight" panose="020B0506000000000000" pitchFamily="34" charset="0"/>
-                  <a:ea typeface="Calibri" panose="020F0502020204030204" pitchFamily="34" charset="0"/>
-                  <a:cs typeface="Times New Roman" panose="02020603050405020304" pitchFamily="18" charset="0"/>
-                </a:rPr>
-                <a:t>userSharing</a:t>
-              </a:r>
-              <a:r>
-                <a:rPr lang="en-US" sz="900" dirty="0">
-                  <a:solidFill>
-                    <a:srgbClr val="000000"/>
-                  </a:solidFill>
-                  <a:effectLst/>
-                  <a:latin typeface="Univers 47 CondensedLight" panose="020B0506000000000000" pitchFamily="34" charset="0"/>
-                  <a:ea typeface="Calibri" panose="020F0502020204030204" pitchFamily="34" charset="0"/>
-                  <a:cs typeface="Times New Roman" panose="02020603050405020304" pitchFamily="18" charset="0"/>
-                </a:rPr>
-                <a:t>)</a:t>
-              </a:r>
-              <a:endParaRPr lang="it-IT" sz="900" dirty="0">
-                <a:effectLst/>
-                <a:latin typeface="Univers 47 CondensedLight" panose="020B0506000000000000" pitchFamily="34" charset="0"/>
-                <a:ea typeface="Calibri" panose="020F0502020204030204" pitchFamily="34" charset="0"/>
-                <a:cs typeface="Times New Roman" panose="02020603050405020304" pitchFamily="18" charset="0"/>
-              </a:endParaRPr>
+                <a:t> (String user, Reservation reservation)</a:t>
+              </a:r>
             </a:p>
             <a:p>
               <a:pPr marL="171450" lvl="0" indent="-171450">
@@ -7057,19 +7081,17 @@
                   <a:solidFill>
                     <a:srgbClr val="000000"/>
                   </a:solidFill>
-                  <a:effectLst/>
-                  <a:latin typeface="Univers 47 CondensedLight" panose="020B0506000000000000" pitchFamily="34" charset="0"/>
-                  <a:ea typeface="Calibri" panose="020F0502020204030204" pitchFamily="34" charset="0"/>
-                  <a:cs typeface="Times New Roman" panose="02020603050405020304" pitchFamily="18" charset="0"/>
-                </a:rPr>
-                <a:t>markSucceded</a:t>
+                  <a:latin typeface="Univers 47 CondensedLight" panose="020B0506000000000000" pitchFamily="34" charset="0"/>
+                  <a:ea typeface="Calibri" panose="020F0502020204030204" pitchFamily="34" charset="0"/>
+                  <a:cs typeface="Times New Roman" panose="02020603050405020304" pitchFamily="18" charset="0"/>
+                </a:rPr>
+                <a:t>cancelReservation</a:t>
               </a:r>
               <a:r>
                 <a:rPr lang="en-US" sz="900" dirty="0">
                   <a:solidFill>
                     <a:srgbClr val="000000"/>
                   </a:solidFill>
-                  <a:effectLst/>
                   <a:latin typeface="Univers 47 CondensedLight" panose="020B0506000000000000" pitchFamily="34" charset="0"/>
                   <a:ea typeface="Calibri" panose="020F0502020204030204" pitchFamily="34" charset="0"/>
                   <a:cs typeface="Times New Roman" panose="02020603050405020304" pitchFamily="18" charset="0"/>
@@ -7087,61 +7109,25 @@
                   <a:solidFill>
                     <a:srgbClr val="000000"/>
                   </a:solidFill>
-                  <a:latin typeface="Univers 47 CondensedLight" panose="020B0506000000000000" pitchFamily="34" charset="0"/>
-                  <a:ea typeface="Calibri" panose="020F0502020204030204" pitchFamily="34" charset="0"/>
-                  <a:cs typeface="Times New Roman" panose="02020603050405020304" pitchFamily="18" charset="0"/>
-                </a:rPr>
-                <a:t>cancelReservation</a:t>
+                  <a:effectLst/>
+                  <a:latin typeface="Univers 47 CondensedLight" panose="020B0506000000000000" pitchFamily="34" charset="0"/>
+                  <a:ea typeface="Calibri" panose="020F0502020204030204" pitchFamily="34" charset="0"/>
+                  <a:cs typeface="Times New Roman" panose="02020603050405020304" pitchFamily="18" charset="0"/>
+                </a:rPr>
+                <a:t>getActiveReservations</a:t>
               </a:r>
               <a:r>
                 <a:rPr lang="en-US" sz="900" dirty="0">
                   <a:solidFill>
                     <a:srgbClr val="000000"/>
                   </a:solidFill>
-                  <a:latin typeface="Univers 47 CondensedLight" panose="020B0506000000000000" pitchFamily="34" charset="0"/>
-                  <a:ea typeface="Calibri" panose="020F0502020204030204" pitchFamily="34" charset="0"/>
-                  <a:cs typeface="Times New Roman" panose="02020603050405020304" pitchFamily="18" charset="0"/>
-                </a:rPr>
-                <a:t> (String user, Reservation </a:t>
-              </a:r>
-              <a:r>
-                <a:rPr lang="en-US" sz="900">
-                  <a:solidFill>
-                    <a:srgbClr val="000000"/>
-                  </a:solidFill>
-                  <a:latin typeface="Univers 47 CondensedLight" panose="020B0506000000000000" pitchFamily="34" charset="0"/>
-                  <a:ea typeface="Calibri" panose="020F0502020204030204" pitchFamily="34" charset="0"/>
-                  <a:cs typeface="Times New Roman" panose="02020603050405020304" pitchFamily="18" charset="0"/>
-                </a:rPr>
-                <a:t>reservation)</a:t>
-              </a:r>
-            </a:p>
-            <a:p>
-              <a:pPr marL="171450" lvl="0" indent="-171450">
-                <a:buFont typeface="Wingdings" panose="05000000000000000000" pitchFamily="2" charset="2"/>
-                <a:buChar char="§"/>
-              </a:pPr>
-              <a:r>
-                <a:rPr lang="en-US" sz="900">
-                  <a:solidFill>
-                    <a:srgbClr val="000000"/>
-                  </a:solidFill>
-                  <a:effectLst/>
-                  <a:latin typeface="Univers 47 CondensedLight" panose="020B0506000000000000" pitchFamily="34" charset="0"/>
-                  <a:ea typeface="Calibri" panose="020F0502020204030204" pitchFamily="34" charset="0"/>
-                  <a:cs typeface="Times New Roman" panose="02020603050405020304" pitchFamily="18" charset="0"/>
-                </a:rPr>
-                <a:t>getActiveReservations ()</a:t>
-              </a:r>
-              <a:endParaRPr lang="en-US" sz="900" dirty="0">
-                <a:solidFill>
-                  <a:srgbClr val="000000"/>
-                </a:solidFill>
-                <a:effectLst/>
-                <a:latin typeface="Univers 47 CondensedLight" panose="020B0506000000000000" pitchFamily="34" charset="0"/>
-                <a:ea typeface="Calibri" panose="020F0502020204030204" pitchFamily="34" charset="0"/>
-                <a:cs typeface="Times New Roman" panose="02020603050405020304" pitchFamily="18" charset="0"/>
-              </a:endParaRPr>
+                  <a:effectLst/>
+                  <a:latin typeface="Univers 47 CondensedLight" panose="020B0506000000000000" pitchFamily="34" charset="0"/>
+                  <a:ea typeface="Calibri" panose="020F0502020204030204" pitchFamily="34" charset="0"/>
+                  <a:cs typeface="Times New Roman" panose="02020603050405020304" pitchFamily="18" charset="0"/>
+                </a:rPr>
+                <a:t> ()</a:t>
+              </a:r>
             </a:p>
           </p:txBody>
         </p:sp>
@@ -7307,8 +7293,8 @@
             <a:solidFill>
               <a:schemeClr val="tx1"/>
             </a:solidFill>
-            <a:headEnd type="arrow" w="med" len="med"/>
-            <a:tailEnd type="arrow" w="med" len="med"/>
+            <a:headEnd type="none" w="med" len="med"/>
+            <a:tailEnd type="none" w="med" len="med"/>
           </a:ln>
         </p:spPr>
         <p:style>
@@ -7943,7 +7929,7 @@
         </p:nvSpPr>
         <p:spPr>
           <a:xfrm>
-            <a:off x="170753" y="4389530"/>
+            <a:off x="170753" y="4630040"/>
             <a:ext cx="1136073" cy="408709"/>
           </a:xfrm>
           <a:prstGeom prst="roundRect">
@@ -7998,7 +7984,7 @@
         </p:nvCxnSpPr>
         <p:spPr>
           <a:xfrm>
-            <a:off x="1306826" y="4593885"/>
+            <a:off x="1306826" y="4834395"/>
             <a:ext cx="353295" cy="0"/>
           </a:xfrm>
           <a:prstGeom prst="line">
@@ -8033,8 +8019,8 @@
         </p:nvSpPr>
         <p:spPr>
           <a:xfrm>
-            <a:off x="5112329" y="3958630"/>
-            <a:ext cx="1482436" cy="408709"/>
+            <a:off x="170751" y="4005529"/>
+            <a:ext cx="1136072" cy="408709"/>
           </a:xfrm>
           <a:prstGeom prst="roundRect">
             <a:avLst/>
@@ -8070,51 +8056,17 @@
           <a:p>
             <a:pPr algn="ctr"/>
             <a:r>
-              <a:rPr lang="it-IT" sz="1100" b="1">
+              <a:rPr lang="it-IT" sz="800" b="1" dirty="0" err="1">
                 <a:latin typeface="Univers 47 CondensedLight" panose="020B0506000000000000" pitchFamily="34" charset="0"/>
               </a:rPr>
               <a:t>ReservationManager</a:t>
             </a:r>
+            <a:endParaRPr lang="it-IT" sz="800" b="1" dirty="0">
+              <a:latin typeface="Univers 47 CondensedLight" panose="020B0506000000000000" pitchFamily="34" charset="0"/>
+            </a:endParaRPr>
           </a:p>
         </p:txBody>
       </p:sp>
-      <p:cxnSp>
-        <p:nvCxnSpPr>
-          <p:cNvPr id="75" name="Connettore diritto 74"/>
-          <p:cNvCxnSpPr/>
-          <p:nvPr/>
-        </p:nvCxnSpPr>
-        <p:spPr>
-          <a:xfrm>
-            <a:off x="4710545" y="4162983"/>
-            <a:ext cx="401783" cy="1"/>
-          </a:xfrm>
-          <a:prstGeom prst="line">
-            <a:avLst/>
-          </a:prstGeom>
-          <a:ln w="12700">
-            <a:solidFill>
-              <a:schemeClr val="tx1"/>
-            </a:solidFill>
-            <a:headEnd type="arrow" w="med" len="med"/>
-            <a:tailEnd type="arrow" w="med" len="med"/>
-          </a:ln>
-        </p:spPr>
-        <p:style>
-          <a:lnRef idx="1">
-            <a:schemeClr val="accent1"/>
-          </a:lnRef>
-          <a:fillRef idx="0">
-            <a:schemeClr val="accent1"/>
-          </a:fillRef>
-          <a:effectRef idx="0">
-            <a:schemeClr val="accent1"/>
-          </a:effectRef>
-          <a:fontRef idx="minor">
-            <a:schemeClr val="tx1"/>
-          </a:fontRef>
-        </p:style>
-      </p:cxnSp>
       <p:sp>
         <p:nvSpPr>
           <p:cNvPr id="76" name="Rettangolo arrotondato 75"/>
@@ -8123,7 +8075,7 @@
         </p:nvSpPr>
         <p:spPr>
           <a:xfrm>
-            <a:off x="5112329" y="5293908"/>
+            <a:off x="5112329" y="5222561"/>
             <a:ext cx="1482436" cy="408709"/>
           </a:xfrm>
           <a:prstGeom prst="roundRect">
@@ -8176,7 +8128,7 @@
         </p:nvCxnSpPr>
         <p:spPr>
           <a:xfrm>
-            <a:off x="4710545" y="5498262"/>
+            <a:off x="4710545" y="5426915"/>
             <a:ext cx="401783" cy="1"/>
           </a:xfrm>
           <a:prstGeom prst="line">
@@ -8211,7 +8163,7 @@
         </p:nvSpPr>
         <p:spPr>
           <a:xfrm>
-            <a:off x="170753" y="4965994"/>
+            <a:off x="170753" y="5239855"/>
             <a:ext cx="1136073" cy="408709"/>
           </a:xfrm>
           <a:prstGeom prst="roundRect">
@@ -8266,7 +8218,7 @@
         </p:nvCxnSpPr>
         <p:spPr>
           <a:xfrm>
-            <a:off x="1306826" y="5170349"/>
+            <a:off x="1306826" y="5444210"/>
             <a:ext cx="353295" cy="0"/>
           </a:xfrm>
           <a:prstGeom prst="line">
@@ -8588,7 +8540,7 @@
                   <a:ea typeface="Calibri" panose="020F0502020204030204" pitchFamily="34" charset="0"/>
                   <a:cs typeface="Times New Roman" panose="02020603050405020304" pitchFamily="18" charset="0"/>
                 </a:rPr>
-                <a:t>flagRequestSolved ()</a:t>
+                <a:t>flagRequestSolved (AssistanceRequest ar)</a:t>
               </a:r>
             </a:p>
           </p:txBody>
@@ -9584,7 +9536,7 @@
         </p:nvSpPr>
         <p:spPr>
           <a:xfrm>
-            <a:off x="5112326" y="4405859"/>
+            <a:off x="5112326" y="4010666"/>
             <a:ext cx="1482437" cy="408709"/>
           </a:xfrm>
           <a:prstGeom prst="roundRect">
@@ -9640,7 +9592,7 @@
         </p:nvCxnSpPr>
         <p:spPr>
           <a:xfrm>
-            <a:off x="4710542" y="4598265"/>
+            <a:off x="4710542" y="4203072"/>
             <a:ext cx="401783" cy="1"/>
           </a:xfrm>
           <a:prstGeom prst="line">
@@ -10130,7 +10082,7 @@
         </p:nvSpPr>
         <p:spPr>
           <a:xfrm>
-            <a:off x="5112325" y="4845183"/>
+            <a:off x="5112325" y="4616278"/>
             <a:ext cx="1482437" cy="408709"/>
           </a:xfrm>
           <a:prstGeom prst="roundRect">
@@ -10186,8 +10138,43 @@
         </p:nvCxnSpPr>
         <p:spPr>
           <a:xfrm>
-            <a:off x="4710541" y="5037589"/>
+            <a:off x="4710541" y="4808684"/>
             <a:ext cx="401783" cy="1"/>
+          </a:xfrm>
+          <a:prstGeom prst="line">
+            <a:avLst/>
+          </a:prstGeom>
+          <a:ln w="12700">
+            <a:solidFill>
+              <a:schemeClr val="tx1"/>
+            </a:solidFill>
+          </a:ln>
+        </p:spPr>
+        <p:style>
+          <a:lnRef idx="1">
+            <a:schemeClr val="accent1"/>
+          </a:lnRef>
+          <a:fillRef idx="0">
+            <a:schemeClr val="accent1"/>
+          </a:fillRef>
+          <a:effectRef idx="0">
+            <a:schemeClr val="accent1"/>
+          </a:effectRef>
+          <a:fontRef idx="minor">
+            <a:schemeClr val="tx1"/>
+          </a:fontRef>
+        </p:style>
+      </p:cxnSp>
+      <p:cxnSp>
+        <p:nvCxnSpPr>
+          <p:cNvPr id="67" name="Connettore diritto 66"/>
+          <p:cNvCxnSpPr/>
+          <p:nvPr/>
+        </p:nvCxnSpPr>
+        <p:spPr>
+          <a:xfrm flipV="1">
+            <a:off x="1306823" y="4195229"/>
+            <a:ext cx="353298" cy="0"/>
           </a:xfrm>
           <a:prstGeom prst="line">
             <a:avLst/>

</xml_diff>